<commit_message>
Added diagram for reverse command
</commit_message>
<xml_diff>
--- a/docs/diagrams/sortExamples.pptx
+++ b/docs/diagrams/sortExamples.pptx
@@ -8,6 +8,7 @@
     <p:sldId id="256" r:id="rId2"/>
     <p:sldId id="257" r:id="rId3"/>
     <p:sldId id="258" r:id="rId4"/>
+    <p:sldId id="259" r:id="rId5"/>
   </p:sldIdLst>
   <p:sldSz cx="12192000" cy="6858000"/>
   <p:notesSz cx="6858000" cy="9144000"/>
@@ -106,6 +107,11 @@
       </a:defRPr>
     </a:lvl9pPr>
   </p:defaultTextStyle>
+  <p:extLst>
+    <p:ext uri="{EFAFB233-063F-42B5-8137-9DF3F51BA10A}">
+      <p15:sldGuideLst xmlns:p15="http://schemas.microsoft.com/office/powerpoint/2012/main"/>
+    </p:ext>
+  </p:extLst>
 </p:presentation>
 </file>
 
@@ -4867,6 +4873,631 @@
 </p:sld>
 </file>
 
+<file path=ppt/slides/slide4.xml><?xml version="1.0" encoding="utf-8"?>
+<p:sld xmlns:a="http://schemas.openxmlformats.org/drawingml/2006/main" xmlns:r="http://schemas.openxmlformats.org/officeDocument/2006/relationships" xmlns:p="http://schemas.openxmlformats.org/presentationml/2006/main">
+  <p:cSld>
+    <p:spTree>
+      <p:nvGrpSpPr>
+        <p:cNvPr id="1" name=""/>
+        <p:cNvGrpSpPr/>
+        <p:nvPr/>
+      </p:nvGrpSpPr>
+      <p:grpSpPr>
+        <a:xfrm>
+          <a:off x="0" y="0"/>
+          <a:ext cx="0" cy="0"/>
+          <a:chOff x="0" y="0"/>
+          <a:chExt cx="0" cy="0"/>
+        </a:xfrm>
+      </p:grpSpPr>
+      <p:pic>
+        <p:nvPicPr>
+          <p:cNvPr id="4" name="Picture 3">
+            <a:extLst>
+              <a:ext uri="{FF2B5EF4-FFF2-40B4-BE49-F238E27FC236}">
+                <a16:creationId xmlns:a16="http://schemas.microsoft.com/office/drawing/2014/main" id="{7F992DF3-4101-4BF5-8B13-FAE2CFCA18C6}"/>
+              </a:ext>
+            </a:extLst>
+          </p:cNvPr>
+          <p:cNvPicPr>
+            <a:picLocks noChangeAspect="1"/>
+          </p:cNvPicPr>
+          <p:nvPr/>
+        </p:nvPicPr>
+        <p:blipFill>
+          <a:blip r:embed="rId2"/>
+          <a:stretch>
+            <a:fillRect/>
+          </a:stretch>
+        </p:blipFill>
+        <p:spPr>
+          <a:xfrm>
+            <a:off x="7070724" y="793749"/>
+            <a:ext cx="4171950" cy="5934075"/>
+          </a:xfrm>
+          <a:prstGeom prst="rect">
+            <a:avLst/>
+          </a:prstGeom>
+        </p:spPr>
+      </p:pic>
+      <p:sp>
+        <p:nvSpPr>
+          <p:cNvPr id="5" name="Rectangle 4">
+            <a:extLst>
+              <a:ext uri="{FF2B5EF4-FFF2-40B4-BE49-F238E27FC236}">
+                <a16:creationId xmlns:a16="http://schemas.microsoft.com/office/drawing/2014/main" id="{7DA50667-290A-48AF-8B47-4EADDFE6FCE9}"/>
+              </a:ext>
+            </a:extLst>
+          </p:cNvPr>
+          <p:cNvSpPr/>
+          <p:nvPr/>
+        </p:nvSpPr>
+        <p:spPr>
+          <a:xfrm>
+            <a:off x="7467599" y="798511"/>
+            <a:ext cx="3056692" cy="371476"/>
+          </a:xfrm>
+          <a:prstGeom prst="rect">
+            <a:avLst/>
+          </a:prstGeom>
+          <a:noFill/>
+          <a:ln>
+            <a:solidFill>
+              <a:srgbClr val="FF0000"/>
+            </a:solidFill>
+          </a:ln>
+        </p:spPr>
+        <p:style>
+          <a:lnRef idx="2">
+            <a:schemeClr val="dk1">
+              <a:shade val="50000"/>
+            </a:schemeClr>
+          </a:lnRef>
+          <a:fillRef idx="1">
+            <a:schemeClr val="dk1"/>
+          </a:fillRef>
+          <a:effectRef idx="0">
+            <a:schemeClr val="dk1"/>
+          </a:effectRef>
+          <a:fontRef idx="minor">
+            <a:schemeClr val="lt1"/>
+          </a:fontRef>
+        </p:style>
+        <p:txBody>
+          <a:bodyPr rtlCol="0" anchor="ctr"/>
+          <a:lstStyle/>
+          <a:p>
+            <a:pPr algn="ctr"/>
+            <a:endParaRPr lang="en-SG"/>
+          </a:p>
+        </p:txBody>
+      </p:sp>
+      <p:sp>
+        <p:nvSpPr>
+          <p:cNvPr id="6" name="Rectangle 5">
+            <a:extLst>
+              <a:ext uri="{FF2B5EF4-FFF2-40B4-BE49-F238E27FC236}">
+                <a16:creationId xmlns:a16="http://schemas.microsoft.com/office/drawing/2014/main" id="{90F2F1C2-5611-45EE-8404-5448438571C4}"/>
+              </a:ext>
+            </a:extLst>
+          </p:cNvPr>
+          <p:cNvSpPr/>
+          <p:nvPr/>
+        </p:nvSpPr>
+        <p:spPr>
+          <a:xfrm>
+            <a:off x="7467599" y="2386011"/>
+            <a:ext cx="1130300" cy="346076"/>
+          </a:xfrm>
+          <a:prstGeom prst="rect">
+            <a:avLst/>
+          </a:prstGeom>
+          <a:noFill/>
+          <a:ln>
+            <a:solidFill>
+              <a:srgbClr val="FF0000"/>
+            </a:solidFill>
+          </a:ln>
+        </p:spPr>
+        <p:style>
+          <a:lnRef idx="2">
+            <a:schemeClr val="dk1">
+              <a:shade val="50000"/>
+            </a:schemeClr>
+          </a:lnRef>
+          <a:fillRef idx="1">
+            <a:schemeClr val="dk1"/>
+          </a:fillRef>
+          <a:effectRef idx="0">
+            <a:schemeClr val="dk1"/>
+          </a:effectRef>
+          <a:fontRef idx="minor">
+            <a:schemeClr val="lt1"/>
+          </a:fontRef>
+        </p:style>
+        <p:txBody>
+          <a:bodyPr rtlCol="0" anchor="ctr"/>
+          <a:lstStyle/>
+          <a:p>
+            <a:pPr algn="ctr"/>
+            <a:endParaRPr lang="en-SG"/>
+          </a:p>
+        </p:txBody>
+      </p:sp>
+      <p:sp>
+        <p:nvSpPr>
+          <p:cNvPr id="7" name="Rectangle 6">
+            <a:extLst>
+              <a:ext uri="{FF2B5EF4-FFF2-40B4-BE49-F238E27FC236}">
+                <a16:creationId xmlns:a16="http://schemas.microsoft.com/office/drawing/2014/main" id="{3581FFED-9889-41F9-A728-63903E52560C}"/>
+              </a:ext>
+            </a:extLst>
+          </p:cNvPr>
+          <p:cNvSpPr/>
+          <p:nvPr/>
+        </p:nvSpPr>
+        <p:spPr>
+          <a:xfrm>
+            <a:off x="7467599" y="3935411"/>
+            <a:ext cx="2463800" cy="346076"/>
+          </a:xfrm>
+          <a:prstGeom prst="rect">
+            <a:avLst/>
+          </a:prstGeom>
+          <a:noFill/>
+          <a:ln>
+            <a:solidFill>
+              <a:srgbClr val="FF0000"/>
+            </a:solidFill>
+          </a:ln>
+        </p:spPr>
+        <p:style>
+          <a:lnRef idx="2">
+            <a:schemeClr val="dk1">
+              <a:shade val="50000"/>
+            </a:schemeClr>
+          </a:lnRef>
+          <a:fillRef idx="1">
+            <a:schemeClr val="dk1"/>
+          </a:fillRef>
+          <a:effectRef idx="0">
+            <a:schemeClr val="dk1"/>
+          </a:effectRef>
+          <a:fontRef idx="minor">
+            <a:schemeClr val="lt1"/>
+          </a:fontRef>
+        </p:style>
+        <p:txBody>
+          <a:bodyPr rtlCol="0" anchor="ctr"/>
+          <a:lstStyle/>
+          <a:p>
+            <a:pPr algn="ctr"/>
+            <a:endParaRPr lang="en-SG"/>
+          </a:p>
+        </p:txBody>
+      </p:sp>
+      <p:sp>
+        <p:nvSpPr>
+          <p:cNvPr id="8" name="Rectangle 7">
+            <a:extLst>
+              <a:ext uri="{FF2B5EF4-FFF2-40B4-BE49-F238E27FC236}">
+                <a16:creationId xmlns:a16="http://schemas.microsoft.com/office/drawing/2014/main" id="{7466764C-75FE-45C4-8FE1-3A9A32A2E516}"/>
+              </a:ext>
+            </a:extLst>
+          </p:cNvPr>
+          <p:cNvSpPr/>
+          <p:nvPr/>
+        </p:nvSpPr>
+        <p:spPr>
+          <a:xfrm>
+            <a:off x="7492999" y="5510211"/>
+            <a:ext cx="2451100" cy="371476"/>
+          </a:xfrm>
+          <a:prstGeom prst="rect">
+            <a:avLst/>
+          </a:prstGeom>
+          <a:noFill/>
+          <a:ln>
+            <a:solidFill>
+              <a:srgbClr val="FF0000"/>
+            </a:solidFill>
+          </a:ln>
+        </p:spPr>
+        <p:style>
+          <a:lnRef idx="2">
+            <a:schemeClr val="dk1">
+              <a:shade val="50000"/>
+            </a:schemeClr>
+          </a:lnRef>
+          <a:fillRef idx="1">
+            <a:schemeClr val="dk1"/>
+          </a:fillRef>
+          <a:effectRef idx="0">
+            <a:schemeClr val="dk1"/>
+          </a:effectRef>
+          <a:fontRef idx="minor">
+            <a:schemeClr val="lt1"/>
+          </a:fontRef>
+        </p:style>
+        <p:txBody>
+          <a:bodyPr rtlCol="0" anchor="ctr"/>
+          <a:lstStyle/>
+          <a:p>
+            <a:pPr algn="ctr"/>
+            <a:endParaRPr lang="en-SG"/>
+          </a:p>
+        </p:txBody>
+      </p:sp>
+      <p:pic>
+        <p:nvPicPr>
+          <p:cNvPr id="9" name="Picture 8">
+            <a:extLst>
+              <a:ext uri="{FF2B5EF4-FFF2-40B4-BE49-F238E27FC236}">
+                <a16:creationId xmlns:a16="http://schemas.microsoft.com/office/drawing/2014/main" id="{F43F8BD7-496F-4B85-9784-109F7AA11B20}"/>
+              </a:ext>
+            </a:extLst>
+          </p:cNvPr>
+          <p:cNvPicPr>
+            <a:picLocks noChangeAspect="1"/>
+          </p:cNvPicPr>
+          <p:nvPr/>
+        </p:nvPicPr>
+        <p:blipFill>
+          <a:blip r:embed="rId3"/>
+          <a:stretch>
+            <a:fillRect/>
+          </a:stretch>
+        </p:blipFill>
+        <p:spPr>
+          <a:xfrm>
+            <a:off x="498476" y="746124"/>
+            <a:ext cx="4305300" cy="5981700"/>
+          </a:xfrm>
+          <a:prstGeom prst="rect">
+            <a:avLst/>
+          </a:prstGeom>
+        </p:spPr>
+      </p:pic>
+      <p:sp>
+        <p:nvSpPr>
+          <p:cNvPr id="10" name="Rectangle 9">
+            <a:extLst>
+              <a:ext uri="{FF2B5EF4-FFF2-40B4-BE49-F238E27FC236}">
+                <a16:creationId xmlns:a16="http://schemas.microsoft.com/office/drawing/2014/main" id="{5BECEEA9-DC11-4862-90A6-EF8EB668FD71}"/>
+              </a:ext>
+            </a:extLst>
+          </p:cNvPr>
+          <p:cNvSpPr/>
+          <p:nvPr/>
+        </p:nvSpPr>
+        <p:spPr>
+          <a:xfrm>
+            <a:off x="923926" y="790573"/>
+            <a:ext cx="2222500" cy="371476"/>
+          </a:xfrm>
+          <a:prstGeom prst="rect">
+            <a:avLst/>
+          </a:prstGeom>
+          <a:noFill/>
+          <a:ln>
+            <a:solidFill>
+              <a:srgbClr val="FF0000"/>
+            </a:solidFill>
+          </a:ln>
+        </p:spPr>
+        <p:style>
+          <a:lnRef idx="2">
+            <a:schemeClr val="dk1">
+              <a:shade val="50000"/>
+            </a:schemeClr>
+          </a:lnRef>
+          <a:fillRef idx="1">
+            <a:schemeClr val="dk1"/>
+          </a:fillRef>
+          <a:effectRef idx="0">
+            <a:schemeClr val="dk1"/>
+          </a:effectRef>
+          <a:fontRef idx="minor">
+            <a:schemeClr val="lt1"/>
+          </a:fontRef>
+        </p:style>
+        <p:txBody>
+          <a:bodyPr rtlCol="0" anchor="ctr"/>
+          <a:lstStyle/>
+          <a:p>
+            <a:pPr algn="ctr"/>
+            <a:endParaRPr lang="en-SG"/>
+          </a:p>
+        </p:txBody>
+      </p:sp>
+      <p:sp>
+        <p:nvSpPr>
+          <p:cNvPr id="11" name="Rectangle 10">
+            <a:extLst>
+              <a:ext uri="{FF2B5EF4-FFF2-40B4-BE49-F238E27FC236}">
+                <a16:creationId xmlns:a16="http://schemas.microsoft.com/office/drawing/2014/main" id="{5439D267-B101-4130-B734-AEB44B220067}"/>
+              </a:ext>
+            </a:extLst>
+          </p:cNvPr>
+          <p:cNvSpPr/>
+          <p:nvPr/>
+        </p:nvSpPr>
+        <p:spPr>
+          <a:xfrm>
+            <a:off x="923926" y="2378073"/>
+            <a:ext cx="2222500" cy="371476"/>
+          </a:xfrm>
+          <a:prstGeom prst="rect">
+            <a:avLst/>
+          </a:prstGeom>
+          <a:noFill/>
+          <a:ln>
+            <a:solidFill>
+              <a:srgbClr val="FF0000"/>
+            </a:solidFill>
+          </a:ln>
+        </p:spPr>
+        <p:style>
+          <a:lnRef idx="2">
+            <a:schemeClr val="dk1">
+              <a:shade val="50000"/>
+            </a:schemeClr>
+          </a:lnRef>
+          <a:fillRef idx="1">
+            <a:schemeClr val="dk1"/>
+          </a:fillRef>
+          <a:effectRef idx="0">
+            <a:schemeClr val="dk1"/>
+          </a:effectRef>
+          <a:fontRef idx="minor">
+            <a:schemeClr val="lt1"/>
+          </a:fontRef>
+        </p:style>
+        <p:txBody>
+          <a:bodyPr rtlCol="0" anchor="ctr"/>
+          <a:lstStyle/>
+          <a:p>
+            <a:pPr algn="ctr"/>
+            <a:endParaRPr lang="en-SG"/>
+          </a:p>
+        </p:txBody>
+      </p:sp>
+      <p:sp>
+        <p:nvSpPr>
+          <p:cNvPr id="12" name="Rectangle 11">
+            <a:extLst>
+              <a:ext uri="{FF2B5EF4-FFF2-40B4-BE49-F238E27FC236}">
+                <a16:creationId xmlns:a16="http://schemas.microsoft.com/office/drawing/2014/main" id="{1704FE25-B35D-4DC3-91CB-36F5DAB3FA35}"/>
+              </a:ext>
+            </a:extLst>
+          </p:cNvPr>
+          <p:cNvSpPr/>
+          <p:nvPr/>
+        </p:nvSpPr>
+        <p:spPr>
+          <a:xfrm>
+            <a:off x="923926" y="3927473"/>
+            <a:ext cx="1016000" cy="371476"/>
+          </a:xfrm>
+          <a:prstGeom prst="rect">
+            <a:avLst/>
+          </a:prstGeom>
+          <a:noFill/>
+          <a:ln>
+            <a:solidFill>
+              <a:srgbClr val="FF0000"/>
+            </a:solidFill>
+          </a:ln>
+        </p:spPr>
+        <p:style>
+          <a:lnRef idx="2">
+            <a:schemeClr val="dk1">
+              <a:shade val="50000"/>
+            </a:schemeClr>
+          </a:lnRef>
+          <a:fillRef idx="1">
+            <a:schemeClr val="dk1"/>
+          </a:fillRef>
+          <a:effectRef idx="0">
+            <a:schemeClr val="dk1"/>
+          </a:effectRef>
+          <a:fontRef idx="minor">
+            <a:schemeClr val="lt1"/>
+          </a:fontRef>
+        </p:style>
+        <p:txBody>
+          <a:bodyPr rtlCol="0" anchor="ctr"/>
+          <a:lstStyle/>
+          <a:p>
+            <a:pPr algn="ctr"/>
+            <a:endParaRPr lang="en-SG"/>
+          </a:p>
+        </p:txBody>
+      </p:sp>
+      <p:sp>
+        <p:nvSpPr>
+          <p:cNvPr id="13" name="Rectangle 12">
+            <a:extLst>
+              <a:ext uri="{FF2B5EF4-FFF2-40B4-BE49-F238E27FC236}">
+                <a16:creationId xmlns:a16="http://schemas.microsoft.com/office/drawing/2014/main" id="{09E2E7F5-00E6-4B95-8606-832889A2B182}"/>
+              </a:ext>
+            </a:extLst>
+          </p:cNvPr>
+          <p:cNvSpPr/>
+          <p:nvPr/>
+        </p:nvSpPr>
+        <p:spPr>
+          <a:xfrm>
+            <a:off x="949326" y="5502273"/>
+            <a:ext cx="2908300" cy="371476"/>
+          </a:xfrm>
+          <a:prstGeom prst="rect">
+            <a:avLst/>
+          </a:prstGeom>
+          <a:noFill/>
+          <a:ln>
+            <a:solidFill>
+              <a:srgbClr val="FF0000"/>
+            </a:solidFill>
+          </a:ln>
+        </p:spPr>
+        <p:style>
+          <a:lnRef idx="2">
+            <a:schemeClr val="dk1">
+              <a:shade val="50000"/>
+            </a:schemeClr>
+          </a:lnRef>
+          <a:fillRef idx="1">
+            <a:schemeClr val="dk1"/>
+          </a:fillRef>
+          <a:effectRef idx="0">
+            <a:schemeClr val="dk1"/>
+          </a:effectRef>
+          <a:fontRef idx="minor">
+            <a:schemeClr val="lt1"/>
+          </a:fontRef>
+        </p:style>
+        <p:txBody>
+          <a:bodyPr rtlCol="0" anchor="ctr"/>
+          <a:lstStyle/>
+          <a:p>
+            <a:pPr algn="ctr"/>
+            <a:endParaRPr lang="en-SG"/>
+          </a:p>
+        </p:txBody>
+      </p:sp>
+      <p:sp>
+        <p:nvSpPr>
+          <p:cNvPr id="14" name="TextBox 13">
+            <a:extLst>
+              <a:ext uri="{FF2B5EF4-FFF2-40B4-BE49-F238E27FC236}">
+                <a16:creationId xmlns:a16="http://schemas.microsoft.com/office/drawing/2014/main" id="{C9F4FD5E-C215-43A3-B999-98F9BED70050}"/>
+              </a:ext>
+            </a:extLst>
+          </p:cNvPr>
+          <p:cNvSpPr txBox="1"/>
+          <p:nvPr/>
+        </p:nvSpPr>
+        <p:spPr>
+          <a:xfrm>
+            <a:off x="678618" y="273049"/>
+            <a:ext cx="3263900" cy="461665"/>
+          </a:xfrm>
+          <a:prstGeom prst="rect">
+            <a:avLst/>
+          </a:prstGeom>
+          <a:noFill/>
+        </p:spPr>
+        <p:txBody>
+          <a:bodyPr wrap="square" rtlCol="0">
+            <a:spAutoFit/>
+          </a:bodyPr>
+          <a:lstStyle/>
+          <a:p>
+            <a:r>
+              <a:rPr lang="en-SG" sz="2400" b="1" dirty="0"/>
+              <a:t>sort -name</a:t>
+            </a:r>
+          </a:p>
+        </p:txBody>
+      </p:sp>
+      <p:sp>
+        <p:nvSpPr>
+          <p:cNvPr id="15" name="TextBox 14">
+            <a:extLst>
+              <a:ext uri="{FF2B5EF4-FFF2-40B4-BE49-F238E27FC236}">
+                <a16:creationId xmlns:a16="http://schemas.microsoft.com/office/drawing/2014/main" id="{D637258F-E23E-4A58-AF6A-DF1C28F69281}"/>
+              </a:ext>
+            </a:extLst>
+          </p:cNvPr>
+          <p:cNvSpPr txBox="1"/>
+          <p:nvPr/>
+        </p:nvSpPr>
+        <p:spPr>
+          <a:xfrm>
+            <a:off x="7244515" y="336846"/>
+            <a:ext cx="3263900" cy="461665"/>
+          </a:xfrm>
+          <a:prstGeom prst="rect">
+            <a:avLst/>
+          </a:prstGeom>
+          <a:noFill/>
+        </p:spPr>
+        <p:txBody>
+          <a:bodyPr wrap="square" rtlCol="0">
+            <a:spAutoFit/>
+          </a:bodyPr>
+          <a:lstStyle/>
+          <a:p>
+            <a:r>
+              <a:rPr lang="en-SG" sz="2400" b="1" dirty="0"/>
+              <a:t>reverse</a:t>
+            </a:r>
+          </a:p>
+        </p:txBody>
+      </p:sp>
+      <p:sp>
+        <p:nvSpPr>
+          <p:cNvPr id="16" name="Arrow: Right 15">
+            <a:extLst>
+              <a:ext uri="{FF2B5EF4-FFF2-40B4-BE49-F238E27FC236}">
+                <a16:creationId xmlns:a16="http://schemas.microsoft.com/office/drawing/2014/main" id="{537E8627-A6A4-4D03-8F8C-C58EC79BE637}"/>
+              </a:ext>
+            </a:extLst>
+          </p:cNvPr>
+          <p:cNvSpPr/>
+          <p:nvPr/>
+        </p:nvSpPr>
+        <p:spPr>
+          <a:xfrm>
+            <a:off x="5305425" y="2457451"/>
+            <a:ext cx="1066800" cy="752476"/>
+          </a:xfrm>
+          <a:prstGeom prst="rightArrow">
+            <a:avLst/>
+          </a:prstGeom>
+          <a:solidFill>
+            <a:srgbClr val="00B050"/>
+          </a:solidFill>
+        </p:spPr>
+        <p:style>
+          <a:lnRef idx="2">
+            <a:schemeClr val="accent6">
+              <a:shade val="50000"/>
+            </a:schemeClr>
+          </a:lnRef>
+          <a:fillRef idx="1">
+            <a:schemeClr val="accent6"/>
+          </a:fillRef>
+          <a:effectRef idx="0">
+            <a:schemeClr val="accent6"/>
+          </a:effectRef>
+          <a:fontRef idx="minor">
+            <a:schemeClr val="lt1"/>
+          </a:fontRef>
+        </p:style>
+        <p:txBody>
+          <a:bodyPr rtlCol="0" anchor="ctr"/>
+          <a:lstStyle/>
+          <a:p>
+            <a:pPr algn="ctr"/>
+            <a:endParaRPr lang="en-SG"/>
+          </a:p>
+        </p:txBody>
+      </p:sp>
+    </p:spTree>
+    <p:extLst>
+      <p:ext uri="{BB962C8B-B14F-4D97-AF65-F5344CB8AC3E}">
+        <p14:creationId xmlns:p14="http://schemas.microsoft.com/office/powerpoint/2010/main" val="926355284"/>
+      </p:ext>
+    </p:extLst>
+  </p:cSld>
+  <p:clrMapOvr>
+    <a:masterClrMapping/>
+  </p:clrMapOvr>
+</p:sld>
+</file>
+
 <file path=ppt/theme/theme1.xml><?xml version="1.0" encoding="utf-8"?>
 <a:theme xmlns:a="http://schemas.openxmlformats.org/drawingml/2006/main" name="Office Theme">
   <a:themeElements>

</xml_diff>